<commit_message>
Fixes PPT and PDF
</commit_message>
<xml_diff>
--- a/CS 370 - Crossword Puzzle.pptx
+++ b/CS 370 - Crossword Puzzle.pptx
@@ -5649,6 +5649,21 @@
             </a:r>
           </a:p>
           <a:p>
+            <a:pPr indent="-228600" lvl="0" marL="457200" rtl="0">
+              <a:spcBef>
+                <a:spcPts val="0"/>
+              </a:spcBef>
+            </a:pPr>
+            <a:r>
+              <a:rPr lang="en"/>
+              <a:t>Dealing with vertical and horizontal words (Added a vertical boolean </a:t>
+            </a:r>
+            <a:r>
+              <a:rPr lang="en"/>
+              <a:t> if true the nextSpace function will increase by row instead of column)</a:t>
+            </a:r>
+          </a:p>
+          <a:p>
             <a:pPr indent="-228600" lvl="0" marL="457200">
               <a:spcBef>
                 <a:spcPts val="0"/>
@@ -5656,7 +5671,7 @@
             </a:pPr>
             <a:r>
               <a:rPr lang="en"/>
-              <a:t>Dealing with vertical and horizontal words (Added a vertical boolean</a:t>
+              <a:t>Getting printing to work correctly (Trial and error for almost two hours) </a:t>
             </a:r>
           </a:p>
           <a:p>
@@ -6029,7 +6044,12 @@
               <a:buNone/>
             </a:pPr>
             <a:r>
-              <a:rPr lang="en" sz="7200"/>
+              <a:rPr lang="en" sz="7200" u="sng">
+                <a:solidFill>
+                  <a:schemeClr val="hlink"/>
+                </a:solidFill>
+                <a:hlinkClick r:id="rId3"/>
+              </a:rPr>
               <a:t>Demo</a:t>
             </a:r>
           </a:p>

</xml_diff>